<commit_message>
Exercício 3.1 - Classificação de Dígitos com Regressão Logística
</commit_message>
<xml_diff>
--- a/machine-learning/notations/semana-3/presentation/06-regularization-overfitting.pptx
+++ b/machine-learning/notations/semana-3/presentation/06-regularization-overfitting.pptx
@@ -7613,8 +7613,8 @@
           </a:p>
         </p:txBody>
       </p:sp>
-      <mc:AlternateContent xmlns:mc="http://schemas.openxmlformats.org/markup-compatibility/2006" xmlns:a14="http://schemas.microsoft.com/office/drawing/2010/main">
-        <mc:Choice Requires="a14">
+      <mc:AlternateContent xmlns:mc="http://schemas.openxmlformats.org/markup-compatibility/2006">
+        <mc:Choice xmlns:a14="http://schemas.microsoft.com/office/drawing/2010/main" Requires="a14">
           <p:sp>
             <p:nvSpPr>
               <p:cNvPr id="5" name="TextBox 4"/>
@@ -7934,10 +7934,10 @@
                     </a:solidFill>
                     <a:cs typeface="Arial" pitchFamily="34" charset="0"/>
                   </a:rPr>
-                  <a:t> a </a:t>
+                  <a:t> </a:t>
                 </a:r>
                 <a:r>
-                  <a:rPr lang="en-US" altLang="ko-KR" sz="1200" dirty="0" err="1">
+                  <a:rPr lang="en-US" altLang="ko-KR" sz="1200">
                     <a:solidFill>
                       <a:schemeClr val="tx1">
                         <a:lumMod val="75000"/>
@@ -7946,7 +7946,7 @@
                     </a:solidFill>
                     <a:cs typeface="Arial" pitchFamily="34" charset="0"/>
                   </a:rPr>
-                  <a:t>oferfitting</a:t>
+                  <a:t>a overfitting</a:t>
                 </a:r>
                 <a:endParaRPr lang="en-US" altLang="ko-KR" sz="1200" dirty="0">
                   <a:solidFill>
@@ -7961,7 +7961,7 @@
             </p:txBody>
           </p:sp>
         </mc:Choice>
-        <mc:Fallback xmlns="">
+        <mc:Fallback>
           <p:sp>
             <p:nvSpPr>
               <p:cNvPr id="5" name="TextBox 4"/>
@@ -18266,8 +18266,8 @@
           </p:sp>
         </mc:Fallback>
       </mc:AlternateContent>
-      <mc:AlternateContent xmlns:mc="http://schemas.openxmlformats.org/markup-compatibility/2006">
-        <mc:Choice xmlns:a14="http://schemas.microsoft.com/office/drawing/2010/main" Requires="a14">
+      <mc:AlternateContent xmlns:mc="http://schemas.openxmlformats.org/markup-compatibility/2006" xmlns:a14="http://schemas.microsoft.com/office/drawing/2010/main">
+        <mc:Choice Requires="a14">
           <p:sp>
             <p:nvSpPr>
               <p:cNvPr id="17" name="CaixaDeTexto 16">
@@ -18367,7 +18367,7 @@
             </p:txBody>
           </p:sp>
         </mc:Choice>
-        <mc:Fallback>
+        <mc:Fallback xmlns="">
           <p:sp>
             <p:nvSpPr>
               <p:cNvPr id="17" name="CaixaDeTexto 16">
@@ -21282,8 +21282,8 @@
           </a:fontRef>
         </p:style>
       </p:cxnSp>
-      <mc:AlternateContent xmlns:mc="http://schemas.openxmlformats.org/markup-compatibility/2006">
-        <mc:Choice xmlns:a14="http://schemas.microsoft.com/office/drawing/2010/main" Requires="a14">
+      <mc:AlternateContent xmlns:mc="http://schemas.openxmlformats.org/markup-compatibility/2006" xmlns:a14="http://schemas.microsoft.com/office/drawing/2010/main">
+        <mc:Choice Requires="a14">
           <p:sp>
             <p:nvSpPr>
               <p:cNvPr id="27" name="CaixaDeTexto 26">
@@ -21364,7 +21364,7 @@
             </p:txBody>
           </p:sp>
         </mc:Choice>
-        <mc:Fallback>
+        <mc:Fallback xmlns="">
           <p:sp>
             <p:nvSpPr>
               <p:cNvPr id="27" name="CaixaDeTexto 26">
@@ -23951,8 +23951,8 @@
           </a:p>
         </p:txBody>
       </p:sp>
-      <mc:AlternateContent xmlns:mc="http://schemas.openxmlformats.org/markup-compatibility/2006">
-        <mc:Choice xmlns:a14="http://schemas.microsoft.com/office/drawing/2010/main" Requires="a14">
+      <mc:AlternateContent xmlns:mc="http://schemas.openxmlformats.org/markup-compatibility/2006" xmlns:a14="http://schemas.microsoft.com/office/drawing/2010/main">
+        <mc:Choice Requires="a14">
           <p:sp>
             <p:nvSpPr>
               <p:cNvPr id="12" name="CaixaDeTexto 11">
@@ -24490,7 +24490,7 @@
             </p:txBody>
           </p:sp>
         </mc:Choice>
-        <mc:Fallback>
+        <mc:Fallback xmlns="">
           <p:sp>
             <p:nvSpPr>
               <p:cNvPr id="12" name="CaixaDeTexto 11">
@@ -24565,8 +24565,8 @@
           </a:prstGeom>
         </p:spPr>
       </p:pic>
-      <mc:AlternateContent xmlns:mc="http://schemas.openxmlformats.org/markup-compatibility/2006">
-        <mc:Choice xmlns:a14="http://schemas.microsoft.com/office/drawing/2010/main" Requires="a14">
+      <mc:AlternateContent xmlns:mc="http://schemas.openxmlformats.org/markup-compatibility/2006" xmlns:a14="http://schemas.microsoft.com/office/drawing/2010/main">
+        <mc:Choice Requires="a14">
           <p:sp>
             <p:nvSpPr>
               <p:cNvPr id="14" name="CaixaDeTexto 13">
@@ -25056,7 +25056,7 @@
             </p:txBody>
           </p:sp>
         </mc:Choice>
-        <mc:Fallback>
+        <mc:Fallback xmlns="">
           <p:sp>
             <p:nvSpPr>
               <p:cNvPr id="14" name="CaixaDeTexto 13">
@@ -25546,8 +25546,8 @@
           </a:p>
         </p:txBody>
       </p:sp>
-      <mc:AlternateContent xmlns:mc="http://schemas.openxmlformats.org/markup-compatibility/2006">
-        <mc:Choice xmlns:a14="http://schemas.microsoft.com/office/drawing/2010/main" Requires="a14">
+      <mc:AlternateContent xmlns:mc="http://schemas.openxmlformats.org/markup-compatibility/2006" xmlns:a14="http://schemas.microsoft.com/office/drawing/2010/main">
+        <mc:Choice Requires="a14">
           <p:sp>
             <p:nvSpPr>
               <p:cNvPr id="14" name="CaixaDeTexto 13">
@@ -26037,7 +26037,7 @@
             </p:txBody>
           </p:sp>
         </mc:Choice>
-        <mc:Fallback>
+        <mc:Fallback xmlns="">
           <p:sp>
             <p:nvSpPr>
               <p:cNvPr id="14" name="CaixaDeTexto 13">
@@ -26082,8 +26082,8 @@
           </p:sp>
         </mc:Fallback>
       </mc:AlternateContent>
-      <mc:AlternateContent xmlns:mc="http://schemas.openxmlformats.org/markup-compatibility/2006">
-        <mc:Choice xmlns:a14="http://schemas.microsoft.com/office/drawing/2010/main" Requires="a14">
+      <mc:AlternateContent xmlns:mc="http://schemas.openxmlformats.org/markup-compatibility/2006" xmlns:a14="http://schemas.microsoft.com/office/drawing/2010/main">
+        <mc:Choice Requires="a14">
           <p:sp>
             <p:nvSpPr>
               <p:cNvPr id="8" name="CaixaDeTexto 7">
@@ -26244,7 +26244,7 @@
             </p:txBody>
           </p:sp>
         </mc:Choice>
-        <mc:Fallback>
+        <mc:Fallback xmlns="">
           <p:sp>
             <p:nvSpPr>
               <p:cNvPr id="8" name="CaixaDeTexto 7">
@@ -26342,8 +26342,8 @@
           </a:p>
         </p:txBody>
       </p:sp>
-      <mc:AlternateContent xmlns:mc="http://schemas.openxmlformats.org/markup-compatibility/2006">
-        <mc:Choice xmlns:a14="http://schemas.microsoft.com/office/drawing/2010/main" Requires="a14">
+      <mc:AlternateContent xmlns:mc="http://schemas.openxmlformats.org/markup-compatibility/2006" xmlns:a14="http://schemas.microsoft.com/office/drawing/2010/main">
+        <mc:Choice Requires="a14">
           <p:sp>
             <p:nvSpPr>
               <p:cNvPr id="10" name="CaixaDeTexto 9">
@@ -26485,7 +26485,7 @@
             </p:txBody>
           </p:sp>
         </mc:Choice>
-        <mc:Fallback>
+        <mc:Fallback xmlns="">
           <p:sp>
             <p:nvSpPr>
               <p:cNvPr id="10" name="CaixaDeTexto 9">
@@ -28472,8 +28472,8 @@
           </p:sp>
         </mc:Fallback>
       </mc:AlternateContent>
-      <mc:AlternateContent xmlns:mc="http://schemas.openxmlformats.org/markup-compatibility/2006">
-        <mc:Choice xmlns:a14="http://schemas.microsoft.com/office/drawing/2010/main" Requires="a14">
+      <mc:AlternateContent xmlns:mc="http://schemas.openxmlformats.org/markup-compatibility/2006" xmlns:a14="http://schemas.microsoft.com/office/drawing/2010/main">
+        <mc:Choice Requires="a14">
           <p:sp>
             <p:nvSpPr>
               <p:cNvPr id="17" name="CaixaDeTexto 16">
@@ -28573,7 +28573,7 @@
             </p:txBody>
           </p:sp>
         </mc:Choice>
-        <mc:Fallback>
+        <mc:Fallback xmlns="">
           <p:sp>
             <p:nvSpPr>
               <p:cNvPr id="17" name="CaixaDeTexto 16">

</xml_diff>